<commit_message>
t'as fait de la merde avec ton merge
</commit_message>
<xml_diff>
--- a/08_Quizz_competition/2018_Quizz1.pptx
+++ b/08_Quizz_competition/2018_Quizz1.pptx
@@ -303,7 +303,7 @@
           <a:p>
             <a:fld id="{96DFF08F-DC6B-4601-B491-B0F83F6DD2DA}" type="datetimeFigureOut">
               <a:rPr lang="en-US" smtClean="0"/>
-              <a:t>12/11/2018</a:t>
+              <a:t>11/28/2018</a:t>
             </a:fld>
             <a:endParaRPr lang="en-US" dirty="0"/>
           </a:p>
@@ -473,7 +473,7 @@
           <a:p>
             <a:fld id="{96DFF08F-DC6B-4601-B491-B0F83F6DD2DA}" type="datetimeFigureOut">
               <a:rPr lang="en-US" smtClean="0"/>
-              <a:t>12/11/2018</a:t>
+              <a:t>11/28/2018</a:t>
             </a:fld>
             <a:endParaRPr lang="en-US" dirty="0"/>
           </a:p>
@@ -696,7 +696,7 @@
           <a:p>
             <a:fld id="{96DFF08F-DC6B-4601-B491-B0F83F6DD2DA}" type="datetimeFigureOut">
               <a:rPr lang="en-US" smtClean="0"/>
-              <a:t>12/11/2018</a:t>
+              <a:t>11/28/2018</a:t>
             </a:fld>
             <a:endParaRPr lang="en-US" dirty="0"/>
           </a:p>
@@ -876,7 +876,7 @@
           <a:p>
             <a:fld id="{96DFF08F-DC6B-4601-B491-B0F83F6DD2DA}" type="datetimeFigureOut">
               <a:rPr lang="en-US" smtClean="0"/>
-              <a:t>12/11/2018</a:t>
+              <a:t>11/28/2018</a:t>
             </a:fld>
             <a:endParaRPr lang="en-US" dirty="0"/>
           </a:p>
@@ -1183,7 +1183,7 @@
             <a:fld id="{96DFF08F-DC6B-4601-B491-B0F83F6DD2DA}" type="datetimeFigureOut">
               <a:rPr lang="en-US" smtClean="0"/>
               <a:pPr/>
-              <a:t>12/11/2018</a:t>
+              <a:t>11/28/2018</a:t>
             </a:fld>
             <a:endParaRPr lang="en-US" dirty="0"/>
           </a:p>
@@ -1488,7 +1488,7 @@
           <a:p>
             <a:fld id="{96DFF08F-DC6B-4601-B491-B0F83F6DD2DA}" type="datetimeFigureOut">
               <a:rPr lang="en-US" smtClean="0"/>
-              <a:t>12/11/2018</a:t>
+              <a:t>11/28/2018</a:t>
             </a:fld>
             <a:endParaRPr lang="en-US" dirty="0"/>
           </a:p>
@@ -1910,7 +1910,7 @@
           <a:p>
             <a:fld id="{96DFF08F-DC6B-4601-B491-B0F83F6DD2DA}" type="datetimeFigureOut">
               <a:rPr lang="en-US" smtClean="0"/>
-              <a:t>12/11/2018</a:t>
+              <a:t>11/28/2018</a:t>
             </a:fld>
             <a:endParaRPr lang="en-US" dirty="0"/>
           </a:p>
@@ -2028,7 +2028,7 @@
           <a:p>
             <a:fld id="{96DFF08F-DC6B-4601-B491-B0F83F6DD2DA}" type="datetimeFigureOut">
               <a:rPr lang="en-US" smtClean="0"/>
-              <a:t>12/11/2018</a:t>
+              <a:t>11/28/2018</a:t>
             </a:fld>
             <a:endParaRPr lang="en-US" dirty="0"/>
           </a:p>
@@ -2123,7 +2123,7 @@
           <a:p>
             <a:fld id="{96DFF08F-DC6B-4601-B491-B0F83F6DD2DA}" type="datetimeFigureOut">
               <a:rPr lang="en-US" smtClean="0"/>
-              <a:t>12/11/2018</a:t>
+              <a:t>11/28/2018</a:t>
             </a:fld>
             <a:endParaRPr lang="en-US" dirty="0"/>
           </a:p>
@@ -2396,7 +2396,7 @@
           <a:p>
             <a:fld id="{96DFF08F-DC6B-4601-B491-B0F83F6DD2DA}" type="datetimeFigureOut">
               <a:rPr lang="en-US" smtClean="0"/>
-              <a:t>12/11/2018</a:t>
+              <a:t>11/28/2018</a:t>
             </a:fld>
             <a:endParaRPr lang="en-US" dirty="0"/>
           </a:p>
@@ -2661,7 +2661,7 @@
           <a:p>
             <a:fld id="{96DFF08F-DC6B-4601-B491-B0F83F6DD2DA}" type="datetimeFigureOut">
               <a:rPr lang="en-US" smtClean="0"/>
-              <a:t>12/11/2018</a:t>
+              <a:t>11/28/2018</a:t>
             </a:fld>
             <a:endParaRPr lang="en-US" dirty="0"/>
           </a:p>
@@ -2911,7 +2911,7 @@
             <a:fld id="{96DFF08F-DC6B-4601-B491-B0F83F6DD2DA}" type="datetimeFigureOut">
               <a:rPr lang="en-US" smtClean="0"/>
               <a:pPr/>
-              <a:t>12/11/2018</a:t>
+              <a:t>11/28/2018</a:t>
             </a:fld>
             <a:endParaRPr lang="en-US" dirty="0"/>
           </a:p>
@@ -4227,8 +4227,13 @@
             </a:pPr>
             <a:r>
               <a:rPr lang="en-US" sz="2400" dirty="0" smtClean="0"/>
-              <a:t>  50mm*80mm*200mm</a:t>
-            </a:r>
+              <a:t>  </a:t>
+            </a:r>
+            <a:r>
+              <a:rPr lang="en-US" sz="2400" dirty="0" smtClean="0"/>
+              <a:t>50mm*80mm*200mm</a:t>
+            </a:r>
+            <a:endParaRPr lang="en-US" sz="2400" dirty="0" smtClean="0"/>
           </a:p>
           <a:p>
             <a:pPr>
@@ -4241,7 +4246,11 @@
             </a:r>
             <a:r>
               <a:rPr lang="en-US" sz="2400" smtClean="0"/>
-              <a:t> 50mm*80mm*300mm</a:t>
+              <a:t> </a:t>
+            </a:r>
+            <a:r>
+              <a:rPr lang="en-US" sz="2400" smtClean="0"/>
+              <a:t>50mm*80mm*300mm</a:t>
             </a:r>
             <a:endParaRPr lang="en-US" sz="2400" dirty="0" smtClean="0"/>
           </a:p>
@@ -4256,8 +4265,13 @@
             </a:r>
             <a:r>
               <a:rPr lang="en-US" sz="2400" dirty="0" smtClean="0"/>
-              <a:t> 10mm*400mm*20mm</a:t>
-            </a:r>
+              <a:t> </a:t>
+            </a:r>
+            <a:r>
+              <a:rPr lang="en-US" sz="2400" dirty="0" smtClean="0"/>
+              <a:t>10mm*400mm*20mm</a:t>
+            </a:r>
+            <a:endParaRPr lang="en-US" sz="2400" dirty="0" smtClean="0"/>
           </a:p>
           <a:p>
             <a:pPr>
@@ -4270,7 +4284,11 @@
             </a:r>
             <a:r>
               <a:rPr lang="en-US" sz="2400" dirty="0" smtClean="0"/>
-              <a:t> 10mm*400mm*30mm</a:t>
+              <a:t> </a:t>
+            </a:r>
+            <a:r>
+              <a:rPr lang="en-US" sz="2400" dirty="0" smtClean="0"/>
+              <a:t>10mm*400mm*30mm</a:t>
             </a:r>
             <a:endParaRPr lang="fr-FR" dirty="0"/>
           </a:p>
@@ -4435,7 +4453,11 @@
             </a:pPr>
             <a:r>
               <a:rPr lang="en-US" dirty="0" smtClean="0"/>
-              <a:t>  The front hoop must be steel</a:t>
+              <a:t>  The </a:t>
+            </a:r>
+            <a:r>
+              <a:rPr lang="en-US" dirty="0" smtClean="0"/>
+              <a:t>front hoop must be steel</a:t>
             </a:r>
           </a:p>
           <a:p>
@@ -5546,7 +5568,11 @@
             </a:r>
             <a:r>
               <a:rPr lang="fr-FR" sz="2400" dirty="0" smtClean="0"/>
-              <a:t> : 525mm </a:t>
+              <a:t> : </a:t>
+            </a:r>
+            <a:r>
+              <a:rPr lang="fr-FR" sz="2400" dirty="0" smtClean="0"/>
+              <a:t>525mm </a:t>
             </a:r>
             <a:r>
               <a:rPr lang="fr-FR" sz="2400" dirty="0" err="1" smtClean="0"/>

</xml_diff>